<commit_message>
Minor cosmetic changes, add a clearer lab.
</commit_message>
<xml_diff>
--- a/slides/Data Science Week 1 - Wednesday 23 March Git.pptx
+++ b/slides/Data Science Week 1 - Wednesday 23 March Git.pptx
@@ -5,7 +5,7 @@
     <p:sldMasterId id="2147483648" r:id="rId1"/>
   </p:sldMasterIdLst>
   <p:notesMasterIdLst>
-    <p:notesMasterId r:id="rId25"/>
+    <p:notesMasterId r:id="rId26"/>
   </p:notesMasterIdLst>
   <p:sldIdLst>
     <p:sldId id="256" r:id="rId2"/>
@@ -28,9 +28,10 @@
     <p:sldId id="272" r:id="rId19"/>
     <p:sldId id="273" r:id="rId20"/>
     <p:sldId id="274" r:id="rId21"/>
-    <p:sldId id="275" r:id="rId22"/>
-    <p:sldId id="276" r:id="rId23"/>
-    <p:sldId id="277" r:id="rId24"/>
+    <p:sldId id="279" r:id="rId22"/>
+    <p:sldId id="275" r:id="rId23"/>
+    <p:sldId id="276" r:id="rId24"/>
+    <p:sldId id="277" r:id="rId25"/>
   </p:sldIdLst>
   <p:sldSz cx="9363075" cy="5257800"/>
   <p:notesSz cx="6858000" cy="9144000"/>
@@ -448,6 +449,11 @@
         </p:txBody>
       </p:sp>
     </p:spTree>
+    <p:extLst>
+      <p:ext uri="{BB962C8B-B14F-4D97-AF65-F5344CB8AC3E}">
+        <p14:creationId xmlns:p14="http://schemas.microsoft.com/office/powerpoint/2010/main" val="2050422051"/>
+      </p:ext>
+    </p:extLst>
   </p:cSld>
   <p:clrMap bg1="lt1" tx1="dk1" bg2="lt2" tx2="dk2" accent1="accent1" accent2="accent2" accent3="accent3" accent4="accent4" accent5="accent5" accent6="accent6" hlink="hlink" folHlink="folHlink"/>
   <p:notesStyle>
@@ -575,7 +581,7 @@
   <p:clrMapOvr>
     <a:masterClrMapping/>
   </p:clrMapOvr>
-  <p:transition spd="med"/>
+  <p:transition xmlns:p14="http://schemas.microsoft.com/office/powerpoint/2010/main" spd="med"/>
 </p:sldLayout>
 </file>
 
@@ -773,7 +779,7 @@
   <p:clrMapOvr>
     <a:masterClrMapping/>
   </p:clrMapOvr>
-  <p:transition spd="med"/>
+  <p:transition xmlns:p14="http://schemas.microsoft.com/office/powerpoint/2010/main" spd="med"/>
 </p:sldLayout>
 </file>
 
@@ -1033,7 +1039,7 @@
   <p:clrMapOvr>
     <a:masterClrMapping/>
   </p:clrMapOvr>
-  <p:transition spd="med"/>
+  <p:transition xmlns:p14="http://schemas.microsoft.com/office/powerpoint/2010/main" spd="med"/>
 </p:sldLayout>
 </file>
 
@@ -1097,7 +1103,7 @@
   <p:clrMapOvr>
     <a:masterClrMapping/>
   </p:clrMapOvr>
-  <p:transition spd="med"/>
+  <p:transition xmlns:p14="http://schemas.microsoft.com/office/powerpoint/2010/main" spd="med"/>
 </p:sldLayout>
 </file>
 
@@ -1178,7 +1184,7 @@
   <p:clrMapOvr>
     <a:masterClrMapping/>
   </p:clrMapOvr>
-  <p:transition spd="med"/>
+  <p:transition xmlns:p14="http://schemas.microsoft.com/office/powerpoint/2010/main" spd="med"/>
 </p:sldLayout>
 </file>
 
@@ -1247,7 +1253,7 @@
   <p:clrMapOvr>
     <a:masterClrMapping/>
   </p:clrMapOvr>
-  <p:transition spd="med"/>
+  <p:transition xmlns:p14="http://schemas.microsoft.com/office/powerpoint/2010/main" spd="med"/>
 </p:sldLayout>
 </file>
 
@@ -1648,7 +1654,7 @@
   <p:clrMapOvr>
     <a:masterClrMapping/>
   </p:clrMapOvr>
-  <p:transition spd="med"/>
+  <p:transition xmlns:p14="http://schemas.microsoft.com/office/powerpoint/2010/main" spd="med"/>
 </p:sldLayout>
 </file>
 
@@ -1877,7 +1883,7 @@
   <p:clrMapOvr>
     <a:masterClrMapping/>
   </p:clrMapOvr>
-  <p:transition spd="med"/>
+  <p:transition xmlns:p14="http://schemas.microsoft.com/office/powerpoint/2010/main" spd="med"/>
 </p:sldLayout>
 </file>
 
@@ -2106,7 +2112,7 @@
   <p:clrMapOvr>
     <a:masterClrMapping/>
   </p:clrMapOvr>
-  <p:transition spd="med"/>
+  <p:transition xmlns:p14="http://schemas.microsoft.com/office/powerpoint/2010/main" spd="med"/>
 </p:sldLayout>
 </file>
 
@@ -2336,7 +2342,7 @@
   <p:clrMapOvr>
     <a:masterClrMapping/>
   </p:clrMapOvr>
-  <p:transition spd="med"/>
+  <p:transition xmlns:p14="http://schemas.microsoft.com/office/powerpoint/2010/main" spd="med"/>
 </p:sldLayout>
 </file>
 
@@ -2600,7 +2606,7 @@
   <p:clrMapOvr>
     <a:masterClrMapping/>
   </p:clrMapOvr>
-  <p:transition spd="med"/>
+  <p:transition xmlns:p14="http://schemas.microsoft.com/office/powerpoint/2010/main" spd="med"/>
 </p:sldLayout>
 </file>
 
@@ -2720,7 +2726,7 @@
           </a:ln>
           <a:extLst>
             <a:ext uri="{C572A759-6A51-4108-AA02-DFA0A04FC94B}">
-              <ma14:wrappingTextBoxFlag xmlns:ma14="http://schemas.microsoft.com/office/mac/drawingml/2011/main" xmlns="" val="1"/>
+              <ma14:wrappingTextBoxFlag xmlns:ma14="http://schemas.microsoft.com/office/mac/drawingml/2011/main" val="1"/>
             </a:ext>
           </a:extLst>
         </p:spPr>
@@ -2757,7 +2763,7 @@
           </a:ln>
           <a:extLst>
             <a:ext uri="{C572A759-6A51-4108-AA02-DFA0A04FC94B}">
-              <ma14:wrappingTextBoxFlag xmlns:ma14="http://schemas.microsoft.com/office/mac/drawingml/2011/main" xmlns="" val="1"/>
+              <ma14:wrappingTextBoxFlag xmlns:ma14="http://schemas.microsoft.com/office/mac/drawingml/2011/main" val="1"/>
             </a:ext>
           </a:extLst>
         </p:spPr>
@@ -2875,7 +2881,7 @@
     <p:sldLayoutId id="2147483659" r:id="rId10"/>
     <p:sldLayoutId id="2147483660" r:id="rId11"/>
   </p:sldLayoutIdLst>
-  <p:transition spd="med"/>
+  <p:transition xmlns:p14="http://schemas.microsoft.com/office/powerpoint/2010/main" spd="med"/>
   <p:txStyles>
     <p:titleStyle>
       <a:lvl1pPr marL="0" marR="0" indent="0" algn="l" defTabSz="584200" latinLnBrk="0">
@@ -3927,6 +3933,7 @@
               </a:defRPr>
             </a:pPr>
             <a:r>
+              <a:rPr dirty="0"/>
               <a:t>DATA SCIENCE</a:t>
             </a:r>
           </a:p>
@@ -3943,6 +3950,7 @@
               </a:defRPr>
             </a:pPr>
             <a:r>
+              <a:rPr dirty="0"/>
               <a:t>10 WEEK PART TIME COURSE</a:t>
             </a:r>
           </a:p>
@@ -3958,7 +3966,7 @@
                 <a:sym typeface="Garamond"/>
               </a:defRPr>
             </a:pPr>
-            <a:endParaRPr/>
+            <a:endParaRPr dirty="0"/>
           </a:p>
           <a:p>
             <a:pPr>
@@ -3973,8 +3981,26 @@
               </a:defRPr>
             </a:pPr>
             <a:r>
-              <a:t>Week 1 Lab - Git</a:t>
-            </a:r>
+              <a:rPr dirty="0"/>
+              <a:t>Week </a:t>
+            </a:r>
+            <a:r>
+              <a:rPr dirty="0" smtClean="0"/>
+              <a:t>1</a:t>
+            </a:r>
+            <a:r>
+              <a:rPr lang="en-AU" dirty="0" smtClean="0"/>
+              <a:t>b –</a:t>
+            </a:r>
+            <a:r>
+              <a:rPr dirty="0" smtClean="0"/>
+              <a:t> Git</a:t>
+            </a:r>
+            <a:r>
+              <a:rPr lang="en-AU" dirty="0" smtClean="0"/>
+              <a:t> Intro</a:t>
+            </a:r>
+            <a:endParaRPr dirty="0"/>
           </a:p>
         </p:txBody>
       </p:sp>
@@ -3983,7 +4009,7 @@
   <p:clrMapOvr>
     <a:masterClrMapping/>
   </p:clrMapOvr>
-  <p:transition spd="med"/>
+  <p:transition xmlns:p14="http://schemas.microsoft.com/office/powerpoint/2010/main" spd="med"/>
 </p:sld>
 </file>
 
@@ -4160,7 +4186,7 @@
           </a:prstGeom>
           <a:extLst>
             <a:ext uri="{C572A759-6A51-4108-AA02-DFA0A04FC94B}">
-              <ma14:wrappingTextBoxFlag xmlns:ma14="http://schemas.microsoft.com/office/mac/drawingml/2011/main" xmlns="" val="1"/>
+              <ma14:wrappingTextBoxFlag xmlns:ma14="http://schemas.microsoft.com/office/mac/drawingml/2011/main" val="1"/>
             </a:ext>
           </a:extLst>
         </p:spPr>
@@ -4275,7 +4301,7 @@
   <p:clrMapOvr>
     <a:masterClrMapping/>
   </p:clrMapOvr>
-  <p:transition spd="slow"/>
+  <p:transition xmlns:p14="http://schemas.microsoft.com/office/powerpoint/2010/main" spd="slow"/>
 </p:sld>
 </file>
 
@@ -4448,7 +4474,7 @@
           </a:prstGeom>
           <a:extLst>
             <a:ext uri="{C572A759-6A51-4108-AA02-DFA0A04FC94B}">
-              <ma14:wrappingTextBoxFlag xmlns:ma14="http://schemas.microsoft.com/office/mac/drawingml/2011/main" xmlns="" val="1"/>
+              <ma14:wrappingTextBoxFlag xmlns:ma14="http://schemas.microsoft.com/office/mac/drawingml/2011/main" val="1"/>
             </a:ext>
           </a:extLst>
         </p:spPr>
@@ -4576,7 +4602,7 @@
   <p:clrMapOvr>
     <a:masterClrMapping/>
   </p:clrMapOvr>
-  <p:transition spd="slow"/>
+  <p:transition xmlns:p14="http://schemas.microsoft.com/office/powerpoint/2010/main" spd="slow"/>
 </p:sld>
 </file>
 
@@ -4749,7 +4775,7 @@
           </a:prstGeom>
           <a:extLst>
             <a:ext uri="{C572A759-6A51-4108-AA02-DFA0A04FC94B}">
-              <ma14:wrappingTextBoxFlag xmlns:ma14="http://schemas.microsoft.com/office/mac/drawingml/2011/main" xmlns="" val="1"/>
+              <ma14:wrappingTextBoxFlag xmlns:ma14="http://schemas.microsoft.com/office/mac/drawingml/2011/main" val="1"/>
             </a:ext>
           </a:extLst>
         </p:spPr>
@@ -4913,7 +4939,7 @@
   <p:clrMapOvr>
     <a:masterClrMapping/>
   </p:clrMapOvr>
-  <p:transition spd="slow"/>
+  <p:transition xmlns:p14="http://schemas.microsoft.com/office/powerpoint/2010/main" spd="slow"/>
 </p:sld>
 </file>
 
@@ -5086,7 +5112,7 @@
           </a:prstGeom>
           <a:extLst>
             <a:ext uri="{C572A759-6A51-4108-AA02-DFA0A04FC94B}">
-              <ma14:wrappingTextBoxFlag xmlns:ma14="http://schemas.microsoft.com/office/mac/drawingml/2011/main" xmlns="" val="1"/>
+              <ma14:wrappingTextBoxFlag xmlns:ma14="http://schemas.microsoft.com/office/mac/drawingml/2011/main" val="1"/>
             </a:ext>
           </a:extLst>
         </p:spPr>
@@ -5261,7 +5287,7 @@
   <p:clrMapOvr>
     <a:masterClrMapping/>
   </p:clrMapOvr>
-  <p:transition spd="slow"/>
+  <p:transition xmlns:p14="http://schemas.microsoft.com/office/powerpoint/2010/main" spd="slow"/>
 </p:sld>
 </file>
 
@@ -5434,7 +5460,7 @@
           </a:prstGeom>
           <a:extLst>
             <a:ext uri="{C572A759-6A51-4108-AA02-DFA0A04FC94B}">
-              <ma14:wrappingTextBoxFlag xmlns:ma14="http://schemas.microsoft.com/office/mac/drawingml/2011/main" xmlns="" val="1"/>
+              <ma14:wrappingTextBoxFlag xmlns:ma14="http://schemas.microsoft.com/office/mac/drawingml/2011/main" val="1"/>
             </a:ext>
           </a:extLst>
         </p:spPr>
@@ -5687,7 +5713,7 @@
   <p:clrMapOvr>
     <a:masterClrMapping/>
   </p:clrMapOvr>
-  <p:transition spd="slow"/>
+  <p:transition xmlns:p14="http://schemas.microsoft.com/office/powerpoint/2010/main" spd="slow"/>
 </p:sld>
 </file>
 
@@ -5860,7 +5886,7 @@
           </a:prstGeom>
           <a:extLst>
             <a:ext uri="{C572A759-6A51-4108-AA02-DFA0A04FC94B}">
-              <ma14:wrappingTextBoxFlag xmlns:ma14="http://schemas.microsoft.com/office/mac/drawingml/2011/main" xmlns="" val="1"/>
+              <ma14:wrappingTextBoxFlag xmlns:ma14="http://schemas.microsoft.com/office/mac/drawingml/2011/main" val="1"/>
             </a:ext>
           </a:extLst>
         </p:spPr>
@@ -6054,7 +6080,7 @@
   <p:clrMapOvr>
     <a:masterClrMapping/>
   </p:clrMapOvr>
-  <p:transition spd="slow"/>
+  <p:transition xmlns:p14="http://schemas.microsoft.com/office/powerpoint/2010/main" spd="slow"/>
 </p:sld>
 </file>
 
@@ -6227,7 +6253,7 @@
           </a:prstGeom>
           <a:extLst>
             <a:ext uri="{C572A759-6A51-4108-AA02-DFA0A04FC94B}">
-              <ma14:wrappingTextBoxFlag xmlns:ma14="http://schemas.microsoft.com/office/mac/drawingml/2011/main" xmlns="" val="1"/>
+              <ma14:wrappingTextBoxFlag xmlns:ma14="http://schemas.microsoft.com/office/mac/drawingml/2011/main" val="1"/>
             </a:ext>
           </a:extLst>
         </p:spPr>
@@ -6381,7 +6407,7 @@
   <p:clrMapOvr>
     <a:masterClrMapping/>
   </p:clrMapOvr>
-  <p:transition spd="slow"/>
+  <p:transition xmlns:p14="http://schemas.microsoft.com/office/powerpoint/2010/main" spd="slow"/>
 </p:sld>
 </file>
 
@@ -6554,7 +6580,7 @@
           </a:prstGeom>
           <a:extLst>
             <a:ext uri="{C572A759-6A51-4108-AA02-DFA0A04FC94B}">
-              <ma14:wrappingTextBoxFlag xmlns:ma14="http://schemas.microsoft.com/office/mac/drawingml/2011/main" xmlns="" val="1"/>
+              <ma14:wrappingTextBoxFlag xmlns:ma14="http://schemas.microsoft.com/office/mac/drawingml/2011/main" val="1"/>
             </a:ext>
           </a:extLst>
         </p:spPr>
@@ -6678,7 +6704,7 @@
   <p:clrMapOvr>
     <a:masterClrMapping/>
   </p:clrMapOvr>
-  <p:transition spd="slow"/>
+  <p:transition xmlns:p14="http://schemas.microsoft.com/office/powerpoint/2010/main" spd="slow"/>
 </p:sld>
 </file>
 
@@ -6851,7 +6877,7 @@
           </a:prstGeom>
           <a:extLst>
             <a:ext uri="{C572A759-6A51-4108-AA02-DFA0A04FC94B}">
-              <ma14:wrappingTextBoxFlag xmlns:ma14="http://schemas.microsoft.com/office/mac/drawingml/2011/main" xmlns="" val="1"/>
+              <ma14:wrappingTextBoxFlag xmlns:ma14="http://schemas.microsoft.com/office/mac/drawingml/2011/main" val="1"/>
             </a:ext>
           </a:extLst>
         </p:spPr>
@@ -7053,7 +7079,7 @@
   <p:clrMapOvr>
     <a:masterClrMapping/>
   </p:clrMapOvr>
-  <p:transition spd="slow"/>
+  <p:transition xmlns:p14="http://schemas.microsoft.com/office/powerpoint/2010/main" spd="slow"/>
 </p:sld>
 </file>
 
@@ -7226,7 +7252,7 @@
           </a:prstGeom>
           <a:extLst>
             <a:ext uri="{C572A759-6A51-4108-AA02-DFA0A04FC94B}">
-              <ma14:wrappingTextBoxFlag xmlns:ma14="http://schemas.microsoft.com/office/mac/drawingml/2011/main" xmlns="" val="1"/>
+              <ma14:wrappingTextBoxFlag xmlns:ma14="http://schemas.microsoft.com/office/mac/drawingml/2011/main" val="1"/>
             </a:ext>
           </a:extLst>
         </p:spPr>
@@ -7409,7 +7435,7 @@
   <p:clrMapOvr>
     <a:masterClrMapping/>
   </p:clrMapOvr>
-  <p:transition spd="slow"/>
+  <p:transition xmlns:p14="http://schemas.microsoft.com/office/powerpoint/2010/main" spd="slow"/>
 </p:sld>
 </file>
 
@@ -7586,7 +7612,7 @@
           </a:prstGeom>
           <a:extLst>
             <a:ext uri="{C572A759-6A51-4108-AA02-DFA0A04FC94B}">
-              <ma14:wrappingTextBoxFlag xmlns:ma14="http://schemas.microsoft.com/office/mac/drawingml/2011/main" xmlns="" val="1"/>
+              <ma14:wrappingTextBoxFlag xmlns:ma14="http://schemas.microsoft.com/office/mac/drawingml/2011/main" val="1"/>
             </a:ext>
           </a:extLst>
         </p:spPr>
@@ -7708,7 +7734,7 @@
   <p:clrMapOvr>
     <a:masterClrMapping/>
   </p:clrMapOvr>
-  <p:transition spd="slow"/>
+  <p:transition xmlns:p14="http://schemas.microsoft.com/office/powerpoint/2010/main" spd="slow"/>
 </p:sld>
 </file>
 
@@ -7881,7 +7907,7 @@
           </a:prstGeom>
           <a:extLst>
             <a:ext uri="{C572A759-6A51-4108-AA02-DFA0A04FC94B}">
-              <ma14:wrappingTextBoxFlag xmlns:ma14="http://schemas.microsoft.com/office/mac/drawingml/2011/main" xmlns="" val="1"/>
+              <ma14:wrappingTextBoxFlag xmlns:ma14="http://schemas.microsoft.com/office/mac/drawingml/2011/main" val="1"/>
             </a:ext>
           </a:extLst>
         </p:spPr>
@@ -7946,6 +7972,7 @@
               </a:lnSpc>
             </a:pPr>
             <a:r>
+              <a:rPr dirty="0"/>
               <a:t>Created a repo on GitHub</a:t>
             </a:r>
           </a:p>
@@ -7956,10 +7983,14 @@
               </a:lnSpc>
             </a:pPr>
             <a:r>
+              <a:rPr dirty="0"/>
               <a:t>Cloned repo to your local computer - </a:t>
             </a:r>
             <a:r>
-              <a:rPr>
+              <a:rPr dirty="0">
+                <a:solidFill>
+                  <a:schemeClr val="accent5"/>
+                </a:solidFill>
                 <a:latin typeface="Menlo"/>
                 <a:ea typeface="Menlo"/>
                 <a:cs typeface="Menlo"/>
@@ -7975,6 +8006,7 @@
               </a:lnSpc>
             </a:pPr>
             <a:r>
+              <a:rPr dirty="0"/>
               <a:t>Automatically sets up your “origin” remote</a:t>
             </a:r>
           </a:p>
@@ -7985,6 +8017,7 @@
               </a:lnSpc>
             </a:pPr>
             <a:r>
+              <a:rPr dirty="0"/>
               <a:t>Made two file changes</a:t>
             </a:r>
           </a:p>
@@ -7995,10 +8028,14 @@
               </a:lnSpc>
             </a:pPr>
             <a:r>
+              <a:rPr dirty="0"/>
               <a:t>Staged changes for committing - </a:t>
             </a:r>
             <a:r>
-              <a:rPr>
+              <a:rPr dirty="0">
+                <a:solidFill>
+                  <a:srgbClr val="C82506"/>
+                </a:solidFill>
                 <a:latin typeface="Menlo"/>
                 <a:ea typeface="Menlo"/>
                 <a:cs typeface="Menlo"/>
@@ -8014,10 +8051,14 @@
               </a:lnSpc>
             </a:pPr>
             <a:r>
+              <a:rPr dirty="0"/>
               <a:t>Committed changes - </a:t>
             </a:r>
             <a:r>
-              <a:rPr>
+              <a:rPr dirty="0">
+                <a:solidFill>
+                  <a:srgbClr val="C82506"/>
+                </a:solidFill>
                 <a:latin typeface="Menlo"/>
                 <a:ea typeface="Menlo"/>
                 <a:cs typeface="Menlo"/>
@@ -8033,10 +8074,14 @@
               </a:lnSpc>
             </a:pPr>
             <a:r>
+              <a:rPr dirty="0"/>
               <a:t>Pushed changes to GitHub - </a:t>
             </a:r>
             <a:r>
-              <a:rPr>
+              <a:rPr dirty="0">
+                <a:solidFill>
+                  <a:srgbClr val="C82506"/>
+                </a:solidFill>
                 <a:latin typeface="Menlo"/>
                 <a:ea typeface="Menlo"/>
                 <a:cs typeface="Menlo"/>
@@ -8052,16 +8097,62 @@
               </a:lnSpc>
             </a:pPr>
             <a:r>
+              <a:rPr dirty="0"/>
               <a:t>Inspected along the way - </a:t>
             </a:r>
             <a:r>
-              <a:rPr>
+              <a:rPr dirty="0">
+                <a:solidFill>
+                  <a:srgbClr val="C82506"/>
+                </a:solidFill>
                 <a:latin typeface="Menlo"/>
                 <a:ea typeface="Menlo"/>
                 <a:cs typeface="Menlo"/>
                 <a:sym typeface="Menlo"/>
               </a:rPr>
-              <a:t>git remote, git status, git log</a:t>
+              <a:t>git remote</a:t>
+            </a:r>
+            <a:r>
+              <a:rPr dirty="0">
+                <a:latin typeface="Menlo"/>
+                <a:ea typeface="Menlo"/>
+                <a:cs typeface="Menlo"/>
+                <a:sym typeface="Menlo"/>
+              </a:rPr>
+              <a:t>, </a:t>
+            </a:r>
+            <a:r>
+              <a:rPr dirty="0">
+                <a:solidFill>
+                  <a:srgbClr val="C82506"/>
+                </a:solidFill>
+                <a:latin typeface="Menlo"/>
+                <a:ea typeface="Menlo"/>
+                <a:cs typeface="Menlo"/>
+                <a:sym typeface="Menlo"/>
+              </a:rPr>
+              <a:t>git status</a:t>
+            </a:r>
+            <a:r>
+              <a:rPr dirty="0">
+                <a:latin typeface="Menlo"/>
+                <a:ea typeface="Menlo"/>
+                <a:cs typeface="Menlo"/>
+                <a:sym typeface="Menlo"/>
+              </a:rPr>
+              <a:t>, </a:t>
+            </a:r>
+            <a:r>
+              <a:rPr dirty="0">
+                <a:solidFill>
+                  <a:srgbClr val="C82506"/>
+                </a:solidFill>
+                <a:latin typeface="Menlo"/>
+                <a:ea typeface="Menlo"/>
+                <a:cs typeface="Menlo"/>
+                <a:sym typeface="Menlo"/>
+              </a:rPr>
+              <a:t>git log</a:t>
             </a:r>
           </a:p>
         </p:txBody>
@@ -8071,11 +8162,401 @@
   <p:clrMapOvr>
     <a:masterClrMapping/>
   </p:clrMapOvr>
-  <p:transition spd="slow"/>
+  <p:transition xmlns:p14="http://schemas.microsoft.com/office/powerpoint/2010/main" spd="slow"/>
 </p:sld>
 </file>
 
 <file path=ppt/slides/slide21.xml><?xml version="1.0" encoding="utf-8"?>
+<p:sld xmlns:a="http://schemas.openxmlformats.org/drawingml/2006/main" xmlns:r="http://schemas.openxmlformats.org/officeDocument/2006/relationships" xmlns:p="http://schemas.openxmlformats.org/presentationml/2006/main">
+  <p:cSld>
+    <p:spTree>
+      <p:nvGrpSpPr>
+        <p:cNvPr id="1" name=""/>
+        <p:cNvGrpSpPr/>
+        <p:nvPr/>
+      </p:nvGrpSpPr>
+      <p:grpSpPr>
+        <a:xfrm>
+          <a:off x="0" y="0"/>
+          <a:ext cx="0" cy="0"/>
+          <a:chOff x="0" y="0"/>
+          <a:chExt cx="0" cy="0"/>
+        </a:xfrm>
+      </p:grpSpPr>
+      <p:sp>
+        <p:nvSpPr>
+          <p:cNvPr id="2" name="TextBox 1"/>
+          <p:cNvSpPr txBox="1"/>
+          <p:nvPr/>
+        </p:nvSpPr>
+        <p:spPr>
+          <a:xfrm>
+            <a:off x="473377" y="519574"/>
+            <a:ext cx="1118508" cy="456535"/>
+          </a:xfrm>
+          <a:prstGeom prst="rect">
+            <a:avLst/>
+          </a:prstGeom>
+          <a:noFill/>
+          <a:ln w="12700" cap="flat">
+            <a:noFill/>
+            <a:miter lim="400000"/>
+          </a:ln>
+          <a:effectLst/>
+          <a:sp3d/>
+        </p:spPr>
+        <p:style>
+          <a:lnRef idx="0">
+            <a:scrgbClr r="0" g="0" b="0"/>
+          </a:lnRef>
+          <a:fillRef idx="0">
+            <a:scrgbClr r="0" g="0" b="0"/>
+          </a:fillRef>
+          <a:effectRef idx="0">
+            <a:scrgbClr r="0" g="0" b="0"/>
+          </a:effectRef>
+          <a:fontRef idx="none"/>
+        </p:style>
+        <p:txBody>
+          <a:bodyPr rot="0" spcFirstLastPara="1" vertOverflow="overflow" horzOverflow="overflow" vert="horz" wrap="none" lIns="50800" tIns="50800" rIns="50800" bIns="50800" numCol="1" spcCol="38100" rtlCol="0" anchor="ctr">
+            <a:spAutoFit/>
+          </a:bodyPr>
+          <a:lstStyle/>
+          <a:p>
+            <a:pPr marL="0" marR="0" indent="0" algn="ctr" defTabSz="584200" rtl="0" fontAlgn="auto" latinLnBrk="0" hangingPunct="0">
+              <a:lnSpc>
+                <a:spcPct val="100000"/>
+              </a:lnSpc>
+              <a:spcBef>
+                <a:spcPts val="0"/>
+              </a:spcBef>
+              <a:spcAft>
+                <a:spcPts val="0"/>
+              </a:spcAft>
+              <a:buClrTx/>
+              <a:buSzTx/>
+              <a:buFontTx/>
+              <a:buNone/>
+              <a:tabLst/>
+            </a:pPr>
+            <a:r>
+              <a:rPr kumimoji="0" lang="en-US" sz="2300" b="1" i="0" u="none" strike="noStrike" cap="none" spc="0" normalizeH="0" baseline="0" dirty="0" err="1" smtClean="0">
+                <a:ln>
+                  <a:noFill/>
+                </a:ln>
+                <a:solidFill>
+                  <a:srgbClr val="000000"/>
+                </a:solidFill>
+                <a:effectLst/>
+                <a:uFill>
+                  <a:solidFill>
+                    <a:srgbClr val="000000"/>
+                  </a:solidFill>
+                </a:uFill>
+                <a:latin typeface="+mj-lt"/>
+                <a:ea typeface="+mj-ea"/>
+                <a:cs typeface="+mj-cs"/>
+                <a:sym typeface="Helvetica"/>
+              </a:rPr>
+              <a:t>Git</a:t>
+            </a:r>
+            <a:r>
+              <a:rPr kumimoji="0" lang="en-US" sz="2300" b="1" i="0" u="none" strike="noStrike" cap="none" spc="0" normalizeH="0" dirty="0" smtClean="0">
+                <a:ln>
+                  <a:noFill/>
+                </a:ln>
+                <a:solidFill>
+                  <a:srgbClr val="000000"/>
+                </a:solidFill>
+                <a:effectLst/>
+                <a:uFill>
+                  <a:solidFill>
+                    <a:srgbClr val="000000"/>
+                  </a:solidFill>
+                </a:uFill>
+                <a:latin typeface="+mj-lt"/>
+                <a:ea typeface="+mj-ea"/>
+                <a:cs typeface="+mj-cs"/>
+                <a:sym typeface="Helvetica"/>
+              </a:rPr>
+              <a:t> Lab</a:t>
+            </a:r>
+            <a:endParaRPr kumimoji="0" lang="en-US" sz="2300" b="1" i="0" u="none" strike="noStrike" cap="none" spc="0" normalizeH="0" baseline="0" dirty="0">
+              <a:ln>
+                <a:noFill/>
+              </a:ln>
+              <a:solidFill>
+                <a:srgbClr val="000000"/>
+              </a:solidFill>
+              <a:effectLst/>
+              <a:uFill>
+                <a:solidFill>
+                  <a:srgbClr val="000000"/>
+                </a:solidFill>
+              </a:uFill>
+              <a:latin typeface="+mj-lt"/>
+              <a:ea typeface="+mj-ea"/>
+              <a:cs typeface="+mj-cs"/>
+              <a:sym typeface="Helvetica"/>
+            </a:endParaRPr>
+          </a:p>
+        </p:txBody>
+      </p:sp>
+      <p:sp>
+        <p:nvSpPr>
+          <p:cNvPr id="3" name="TextBox 2"/>
+          <p:cNvSpPr txBox="1"/>
+          <p:nvPr/>
+        </p:nvSpPr>
+        <p:spPr>
+          <a:xfrm>
+            <a:off x="2678463" y="1297372"/>
+            <a:ext cx="4119688" cy="2318584"/>
+          </a:xfrm>
+          <a:prstGeom prst="rect">
+            <a:avLst/>
+          </a:prstGeom>
+          <a:noFill/>
+          <a:ln w="12700" cap="flat">
+            <a:noFill/>
+            <a:miter lim="400000"/>
+          </a:ln>
+          <a:effectLst/>
+          <a:sp3d/>
+        </p:spPr>
+        <p:style>
+          <a:lnRef idx="0">
+            <a:scrgbClr r="0" g="0" b="0"/>
+          </a:lnRef>
+          <a:fillRef idx="0">
+            <a:scrgbClr r="0" g="0" b="0"/>
+          </a:fillRef>
+          <a:effectRef idx="0">
+            <a:scrgbClr r="0" g="0" b="0"/>
+          </a:effectRef>
+          <a:fontRef idx="none"/>
+        </p:style>
+        <p:txBody>
+          <a:bodyPr rot="0" spcFirstLastPara="1" vertOverflow="overflow" horzOverflow="overflow" vert="horz" wrap="square" lIns="50800" tIns="50800" rIns="50800" bIns="50800" numCol="1" spcCol="38100" rtlCol="0" anchor="ctr">
+            <a:spAutoFit/>
+          </a:bodyPr>
+          <a:lstStyle/>
+          <a:p>
+            <a:pPr marL="457200" marR="0" indent="-457200" algn="l" defTabSz="584200" rtl="0" fontAlgn="auto" latinLnBrk="0" hangingPunct="0">
+              <a:lnSpc>
+                <a:spcPct val="100000"/>
+              </a:lnSpc>
+              <a:spcBef>
+                <a:spcPts val="0"/>
+              </a:spcBef>
+              <a:spcAft>
+                <a:spcPts val="0"/>
+              </a:spcAft>
+              <a:buClrTx/>
+              <a:buSzTx/>
+              <a:buFontTx/>
+              <a:buAutoNum type="arabicPeriod"/>
+              <a:tabLst/>
+            </a:pPr>
+            <a:r>
+              <a:rPr kumimoji="0" lang="en-US" sz="1800" b="1" i="0" u="none" strike="noStrike" cap="none" spc="0" normalizeH="0" baseline="0" dirty="0" smtClean="0">
+                <a:ln>
+                  <a:noFill/>
+                </a:ln>
+                <a:solidFill>
+                  <a:srgbClr val="000000"/>
+                </a:solidFill>
+                <a:effectLst/>
+                <a:uFill>
+                  <a:solidFill>
+                    <a:srgbClr val="000000"/>
+                  </a:solidFill>
+                </a:uFill>
+                <a:sym typeface="Helvetica"/>
+              </a:rPr>
+              <a:t>Make a repo</a:t>
+            </a:r>
+            <a:r>
+              <a:rPr kumimoji="0" lang="en-US" sz="1800" b="1" i="0" u="none" strike="noStrike" cap="none" spc="0" normalizeH="0" dirty="0" smtClean="0">
+                <a:ln>
+                  <a:noFill/>
+                </a:ln>
+                <a:solidFill>
+                  <a:srgbClr val="000000"/>
+                </a:solidFill>
+                <a:effectLst/>
+                <a:uFill>
+                  <a:solidFill>
+                    <a:srgbClr val="000000"/>
+                  </a:solidFill>
+                </a:uFill>
+                <a:sym typeface="Helvetica"/>
+              </a:rPr>
+              <a:t> for your project</a:t>
+            </a:r>
+          </a:p>
+          <a:p>
+            <a:pPr marL="457200" marR="0" indent="-457200" algn="l" defTabSz="584200" rtl="0" fontAlgn="auto" latinLnBrk="0" hangingPunct="0">
+              <a:lnSpc>
+                <a:spcPct val="100000"/>
+              </a:lnSpc>
+              <a:spcBef>
+                <a:spcPts val="0"/>
+              </a:spcBef>
+              <a:spcAft>
+                <a:spcPts val="0"/>
+              </a:spcAft>
+              <a:buClrTx/>
+              <a:buSzTx/>
+              <a:buFontTx/>
+              <a:buAutoNum type="arabicPeriod"/>
+              <a:tabLst/>
+            </a:pPr>
+            <a:r>
+              <a:rPr kumimoji="0" lang="en-US" sz="1800" b="1" i="0" u="none" strike="noStrike" cap="none" spc="0" normalizeH="0" baseline="0" dirty="0" smtClean="0">
+                <a:ln>
+                  <a:noFill/>
+                </a:ln>
+                <a:solidFill>
+                  <a:srgbClr val="000000"/>
+                </a:solidFill>
+                <a:effectLst/>
+                <a:uFill>
+                  <a:solidFill>
+                    <a:srgbClr val="000000"/>
+                  </a:solidFill>
+                </a:uFill>
+                <a:sym typeface="Helvetica"/>
+              </a:rPr>
+              <a:t>Clone it to your laptop</a:t>
+            </a:r>
+          </a:p>
+          <a:p>
+            <a:pPr marL="457200" marR="0" indent="-457200" algn="l" defTabSz="584200" rtl="0" fontAlgn="auto" latinLnBrk="0" hangingPunct="0">
+              <a:lnSpc>
+                <a:spcPct val="100000"/>
+              </a:lnSpc>
+              <a:spcBef>
+                <a:spcPts val="0"/>
+              </a:spcBef>
+              <a:spcAft>
+                <a:spcPts val="0"/>
+              </a:spcAft>
+              <a:buClrTx/>
+              <a:buSzTx/>
+              <a:buFontTx/>
+              <a:buAutoNum type="arabicPeriod"/>
+              <a:tabLst/>
+            </a:pPr>
+            <a:r>
+              <a:rPr lang="en-US" sz="1800" dirty="0" smtClean="0"/>
+              <a:t>Edit something / create some new files</a:t>
+            </a:r>
+          </a:p>
+          <a:p>
+            <a:pPr marL="457200" marR="0" indent="-457200" algn="l" defTabSz="584200" rtl="0" fontAlgn="auto" latinLnBrk="0" hangingPunct="0">
+              <a:lnSpc>
+                <a:spcPct val="100000"/>
+              </a:lnSpc>
+              <a:spcBef>
+                <a:spcPts val="0"/>
+              </a:spcBef>
+              <a:spcAft>
+                <a:spcPts val="0"/>
+              </a:spcAft>
+              <a:buClrTx/>
+              <a:buSzTx/>
+              <a:buFontTx/>
+              <a:buAutoNum type="arabicPeriod"/>
+              <a:tabLst/>
+            </a:pPr>
+            <a:r>
+              <a:rPr lang="en-US" sz="1800" dirty="0" smtClean="0"/>
+              <a:t>Use </a:t>
+            </a:r>
+            <a:r>
+              <a:rPr lang="en-US" sz="1800" dirty="0" err="1" smtClean="0"/>
+              <a:t>git</a:t>
+            </a:r>
+            <a:r>
+              <a:rPr lang="en-US" sz="1800" dirty="0" smtClean="0"/>
+              <a:t> add, </a:t>
+            </a:r>
+            <a:r>
+              <a:rPr lang="en-US" sz="1800" dirty="0" err="1" smtClean="0"/>
+              <a:t>git</a:t>
+            </a:r>
+            <a:r>
+              <a:rPr lang="en-US" sz="1800" dirty="0" smtClean="0"/>
+              <a:t> commit and </a:t>
+            </a:r>
+            <a:r>
+              <a:rPr lang="en-US" sz="1800" dirty="0" err="1" smtClean="0"/>
+              <a:t>git</a:t>
+            </a:r>
+            <a:r>
+              <a:rPr lang="en-US" sz="1800" dirty="0" smtClean="0"/>
+              <a:t> push</a:t>
+            </a:r>
+          </a:p>
+          <a:p>
+            <a:pPr marL="457200" marR="0" indent="-457200" algn="l" defTabSz="584200" rtl="0" fontAlgn="auto" latinLnBrk="0" hangingPunct="0">
+              <a:lnSpc>
+                <a:spcPct val="100000"/>
+              </a:lnSpc>
+              <a:spcBef>
+                <a:spcPts val="0"/>
+              </a:spcBef>
+              <a:spcAft>
+                <a:spcPts val="0"/>
+              </a:spcAft>
+              <a:buClrTx/>
+              <a:buSzTx/>
+              <a:buFontTx/>
+              <a:buAutoNum type="arabicPeriod"/>
+              <a:tabLst/>
+            </a:pPr>
+            <a:r>
+              <a:rPr lang="en-US" sz="1800" dirty="0" smtClean="0"/>
+              <a:t>Confirm that the changed file is on </a:t>
+            </a:r>
+            <a:r>
+              <a:rPr lang="en-US" sz="1800" dirty="0" err="1" smtClean="0"/>
+              <a:t>github</a:t>
+            </a:r>
+            <a:endParaRPr kumimoji="0" lang="en-US" sz="1800" b="1" i="0" u="none" strike="noStrike" cap="none" spc="0" normalizeH="0" baseline="0" dirty="0">
+              <a:ln>
+                <a:noFill/>
+              </a:ln>
+              <a:solidFill>
+                <a:srgbClr val="000000"/>
+              </a:solidFill>
+              <a:effectLst/>
+              <a:uFill>
+                <a:solidFill>
+                  <a:srgbClr val="000000"/>
+                </a:solidFill>
+              </a:uFill>
+              <a:sym typeface="Helvetica"/>
+            </a:endParaRPr>
+          </a:p>
+        </p:txBody>
+      </p:sp>
+    </p:spTree>
+    <p:extLst>
+      <p:ext uri="{BB962C8B-B14F-4D97-AF65-F5344CB8AC3E}">
+        <p14:creationId xmlns:p14="http://schemas.microsoft.com/office/powerpoint/2010/main" val="819224028"/>
+      </p:ext>
+    </p:extLst>
+  </p:cSld>
+  <p:clrMapOvr>
+    <a:masterClrMapping/>
+  </p:clrMapOvr>
+  <p:transition xmlns:p14="http://schemas.microsoft.com/office/powerpoint/2010/main" spd="med"/>
+</p:sld>
+</file>
+
+<file path=ppt/slides/slide22.xml><?xml version="1.0" encoding="utf-8"?>
 <p:sld xmlns:a="http://schemas.openxmlformats.org/drawingml/2006/main" xmlns:r="http://schemas.openxmlformats.org/officeDocument/2006/relationships" xmlns:p="http://schemas.openxmlformats.org/presentationml/2006/main">
   <p:cSld>
     <p:spTree>
@@ -8124,11 +8605,11 @@
   <p:clrMapOvr>
     <a:masterClrMapping/>
   </p:clrMapOvr>
-  <p:transition spd="slow"/>
+  <p:transition xmlns:p14="http://schemas.microsoft.com/office/powerpoint/2010/main" spd="slow"/>
 </p:sld>
 </file>
 
-<file path=ppt/slides/slide22.xml><?xml version="1.0" encoding="utf-8"?>
+<file path=ppt/slides/slide23.xml><?xml version="1.0" encoding="utf-8"?>
 <p:sld xmlns:a="http://schemas.openxmlformats.org/drawingml/2006/main" xmlns:r="http://schemas.openxmlformats.org/officeDocument/2006/relationships" xmlns:p="http://schemas.openxmlformats.org/presentationml/2006/main">
   <p:cSld>
     <p:spTree>
@@ -8177,11 +8658,11 @@
   <p:clrMapOvr>
     <a:masterClrMapping/>
   </p:clrMapOvr>
-  <p:transition spd="slow"/>
+  <p:transition xmlns:p14="http://schemas.microsoft.com/office/powerpoint/2010/main" spd="slow"/>
 </p:sld>
 </file>
 
-<file path=ppt/slides/slide23.xml><?xml version="1.0" encoding="utf-8"?>
+<file path=ppt/slides/slide24.xml><?xml version="1.0" encoding="utf-8"?>
 <p:sld xmlns:a="http://schemas.openxmlformats.org/drawingml/2006/main" xmlns:r="http://schemas.openxmlformats.org/officeDocument/2006/relationships" xmlns:p="http://schemas.openxmlformats.org/presentationml/2006/main">
   <p:cSld>
     <p:spTree>
@@ -8230,7 +8711,7 @@
   <p:clrMapOvr>
     <a:masterClrMapping/>
   </p:clrMapOvr>
-  <p:transition spd="slow"/>
+  <p:transition xmlns:p14="http://schemas.microsoft.com/office/powerpoint/2010/main" spd="slow"/>
 </p:sld>
 </file>
 
@@ -8407,7 +8888,7 @@
           </a:prstGeom>
           <a:extLst>
             <a:ext uri="{C572A759-6A51-4108-AA02-DFA0A04FC94B}">
-              <ma14:wrappingTextBoxFlag xmlns:ma14="http://schemas.microsoft.com/office/mac/drawingml/2011/main" xmlns="" val="1"/>
+              <ma14:wrappingTextBoxFlag xmlns:ma14="http://schemas.microsoft.com/office/mac/drawingml/2011/main" val="1"/>
             </a:ext>
           </a:extLst>
         </p:spPr>
@@ -8546,7 +9027,7 @@
   <p:clrMapOvr>
     <a:masterClrMapping/>
   </p:clrMapOvr>
-  <p:transition spd="slow"/>
+  <p:transition xmlns:p14="http://schemas.microsoft.com/office/powerpoint/2010/main" spd="slow"/>
 </p:sld>
 </file>
 
@@ -8723,7 +9204,7 @@
           </a:prstGeom>
           <a:extLst>
             <a:ext uri="{C572A759-6A51-4108-AA02-DFA0A04FC94B}">
-              <ma14:wrappingTextBoxFlag xmlns:ma14="http://schemas.microsoft.com/office/mac/drawingml/2011/main" xmlns="" val="1"/>
+              <ma14:wrappingTextBoxFlag xmlns:ma14="http://schemas.microsoft.com/office/mac/drawingml/2011/main" val="1"/>
             </a:ext>
           </a:extLst>
         </p:spPr>
@@ -8881,7 +9362,7 @@
   <p:clrMapOvr>
     <a:masterClrMapping/>
   </p:clrMapOvr>
-  <p:transition spd="slow"/>
+  <p:transition xmlns:p14="http://schemas.microsoft.com/office/powerpoint/2010/main" spd="slow"/>
 </p:sld>
 </file>
 
@@ -9058,7 +9539,7 @@
           </a:prstGeom>
           <a:extLst>
             <a:ext uri="{C572A759-6A51-4108-AA02-DFA0A04FC94B}">
-              <ma14:wrappingTextBoxFlag xmlns:ma14="http://schemas.microsoft.com/office/mac/drawingml/2011/main" xmlns="" val="1"/>
+              <ma14:wrappingTextBoxFlag xmlns:ma14="http://schemas.microsoft.com/office/mac/drawingml/2011/main" val="1"/>
             </a:ext>
           </a:extLst>
         </p:spPr>
@@ -9116,7 +9597,7 @@
         </p:nvGraphicFramePr>
         <p:xfrm>
           <a:off x="457200" y="1112661"/>
-          <a:ext cx="8448675" cy="3580272"/>
+          <a:ext cx="8448675" cy="3810000"/>
         </p:xfrm>
         <a:graphic>
           <a:graphicData uri="http://schemas.openxmlformats.org/drawingml/2006/table">
@@ -9128,21 +9609,21 @@
                 <a:gridCol w="2173111">
                   <a:extLst>
                     <a:ext uri="{9D8B030D-6E8A-4147-A177-3AD203B41FA5}">
-                      <a16:colId xmlns:a16="http://schemas.microsoft.com/office/drawing/2014/main" val="600125839"/>
+                      <a16:colId xmlns:a16="http://schemas.microsoft.com/office/drawing/2014/main" xmlns="" val="600125839"/>
                     </a:ext>
                   </a:extLst>
                 </a:gridCol>
                 <a:gridCol w="4109156">
                   <a:extLst>
                     <a:ext uri="{9D8B030D-6E8A-4147-A177-3AD203B41FA5}">
-                      <a16:colId xmlns:a16="http://schemas.microsoft.com/office/drawing/2014/main" val="2468877232"/>
+                      <a16:colId xmlns:a16="http://schemas.microsoft.com/office/drawing/2014/main" xmlns="" val="2468877232"/>
                     </a:ext>
                   </a:extLst>
                 </a:gridCol>
                 <a:gridCol w="2166408">
                   <a:extLst>
                     <a:ext uri="{9D8B030D-6E8A-4147-A177-3AD203B41FA5}">
-                      <a16:colId xmlns:a16="http://schemas.microsoft.com/office/drawing/2014/main" val="3642540341"/>
+                      <a16:colId xmlns:a16="http://schemas.microsoft.com/office/drawing/2014/main" xmlns="" val="3642540341"/>
                     </a:ext>
                   </a:extLst>
                 </a:gridCol>
@@ -9197,7 +9678,7 @@
                 </a:tc>
                 <a:extLst>
                   <a:ext uri="{0D108BD9-81ED-4DB2-BD59-A6C34878D82A}">
-                    <a16:rowId xmlns:a16="http://schemas.microsoft.com/office/drawing/2014/main" val="4289102780"/>
+                    <a16:rowId xmlns:a16="http://schemas.microsoft.com/office/drawing/2014/main" xmlns="" val="4289102780"/>
                   </a:ext>
                 </a:extLst>
               </a:tr>
@@ -9247,7 +9728,7 @@
                 </a:tc>
                 <a:extLst>
                   <a:ext uri="{0D108BD9-81ED-4DB2-BD59-A6C34878D82A}">
-                    <a16:rowId xmlns:a16="http://schemas.microsoft.com/office/drawing/2014/main" val="3233415237"/>
+                    <a16:rowId xmlns:a16="http://schemas.microsoft.com/office/drawing/2014/main" xmlns="" val="3233415237"/>
                   </a:ext>
                 </a:extLst>
               </a:tr>
@@ -9305,7 +9786,7 @@
                 </a:tc>
                 <a:extLst>
                   <a:ext uri="{0D108BD9-81ED-4DB2-BD59-A6C34878D82A}">
-                    <a16:rowId xmlns:a16="http://schemas.microsoft.com/office/drawing/2014/main" val="375668650"/>
+                    <a16:rowId xmlns:a16="http://schemas.microsoft.com/office/drawing/2014/main" xmlns="" val="375668650"/>
                   </a:ext>
                 </a:extLst>
               </a:tr>
@@ -9373,7 +9854,7 @@
                 </a:tc>
                 <a:extLst>
                   <a:ext uri="{0D108BD9-81ED-4DB2-BD59-A6C34878D82A}">
-                    <a16:rowId xmlns:a16="http://schemas.microsoft.com/office/drawing/2014/main" val="1123399970"/>
+                    <a16:rowId xmlns:a16="http://schemas.microsoft.com/office/drawing/2014/main" xmlns="" val="1123399970"/>
                   </a:ext>
                 </a:extLst>
               </a:tr>
@@ -9441,7 +9922,7 @@
                 </a:tc>
                 <a:extLst>
                   <a:ext uri="{0D108BD9-81ED-4DB2-BD59-A6C34878D82A}">
-                    <a16:rowId xmlns:a16="http://schemas.microsoft.com/office/drawing/2014/main" val="2253595096"/>
+                    <a16:rowId xmlns:a16="http://schemas.microsoft.com/office/drawing/2014/main" xmlns="" val="2253595096"/>
                   </a:ext>
                 </a:extLst>
               </a:tr>
@@ -9459,7 +9940,7 @@
   <p:clrMapOvr>
     <a:masterClrMapping/>
   </p:clrMapOvr>
-  <p:transition spd="slow"/>
+  <p:transition xmlns:p14="http://schemas.microsoft.com/office/powerpoint/2010/main" spd="slow"/>
 </p:sld>
 </file>
 
@@ -9636,7 +10117,7 @@
           </a:prstGeom>
           <a:extLst>
             <a:ext uri="{C572A759-6A51-4108-AA02-DFA0A04FC94B}">
-              <ma14:wrappingTextBoxFlag xmlns:ma14="http://schemas.microsoft.com/office/mac/drawingml/2011/main" xmlns="" val="1"/>
+              <ma14:wrappingTextBoxFlag xmlns:ma14="http://schemas.microsoft.com/office/mac/drawingml/2011/main" val="1"/>
             </a:ext>
           </a:extLst>
         </p:spPr>
@@ -9837,7 +10318,7 @@
   <p:clrMapOvr>
     <a:masterClrMapping/>
   </p:clrMapOvr>
-  <p:transition spd="slow"/>
+  <p:transition xmlns:p14="http://schemas.microsoft.com/office/powerpoint/2010/main" spd="slow"/>
 </p:sld>
 </file>
 
@@ -10014,7 +10495,7 @@
           </a:prstGeom>
           <a:extLst>
             <a:ext uri="{C572A759-6A51-4108-AA02-DFA0A04FC94B}">
-              <ma14:wrappingTextBoxFlag xmlns:ma14="http://schemas.microsoft.com/office/mac/drawingml/2011/main" xmlns="" val="1"/>
+              <ma14:wrappingTextBoxFlag xmlns:ma14="http://schemas.microsoft.com/office/mac/drawingml/2011/main" val="1"/>
             </a:ext>
           </a:extLst>
         </p:spPr>
@@ -10119,7 +10600,7 @@
   <p:clrMapOvr>
     <a:masterClrMapping/>
   </p:clrMapOvr>
-  <p:transition spd="slow"/>
+  <p:transition xmlns:p14="http://schemas.microsoft.com/office/powerpoint/2010/main" spd="slow"/>
 </p:sld>
 </file>
 
@@ -10296,7 +10777,7 @@
           </a:prstGeom>
           <a:extLst>
             <a:ext uri="{C572A759-6A51-4108-AA02-DFA0A04FC94B}">
-              <ma14:wrappingTextBoxFlag xmlns:ma14="http://schemas.microsoft.com/office/mac/drawingml/2011/main" xmlns="" val="1"/>
+              <ma14:wrappingTextBoxFlag xmlns:ma14="http://schemas.microsoft.com/office/mac/drawingml/2011/main" val="1"/>
             </a:ext>
           </a:extLst>
         </p:spPr>
@@ -10412,7 +10893,7 @@
   <p:clrMapOvr>
     <a:masterClrMapping/>
   </p:clrMapOvr>
-  <p:transition spd="slow"/>
+  <p:transition xmlns:p14="http://schemas.microsoft.com/office/powerpoint/2010/main" spd="slow"/>
 </p:sld>
 </file>
 
@@ -10589,7 +11070,7 @@
           </a:prstGeom>
           <a:extLst>
             <a:ext uri="{C572A759-6A51-4108-AA02-DFA0A04FC94B}">
-              <ma14:wrappingTextBoxFlag xmlns:ma14="http://schemas.microsoft.com/office/mac/drawingml/2011/main" xmlns="" val="1"/>
+              <ma14:wrappingTextBoxFlag xmlns:ma14="http://schemas.microsoft.com/office/mac/drawingml/2011/main" val="1"/>
             </a:ext>
           </a:extLst>
         </p:spPr>
@@ -10754,7 +11235,7 @@
   <p:clrMapOvr>
     <a:masterClrMapping/>
   </p:clrMapOvr>
-  <p:transition spd="slow"/>
+  <p:transition xmlns:p14="http://schemas.microsoft.com/office/powerpoint/2010/main" spd="slow"/>
 </p:sld>
 </file>
 

</xml_diff>